<commit_message>
Edited statistics and details
</commit_message>
<xml_diff>
--- a/iGuide.pptx
+++ b/iGuide.pptx
@@ -7694,12 +7694,39 @@
         </p:nvSpPr>
         <p:spPr/>
         <p:txBody>
-          <a:bodyPr/>
+          <a:bodyPr>
+            <a:normAutofit fontScale="92500" lnSpcReduction="10000"/>
+          </a:bodyPr>
           <a:lstStyle/>
           <a:p>
             <a:r>
+              <a:rPr lang="en-US" sz="2400" dirty="0"/>
+              <a:t>Guiding computer with the motion of eyes</a:t>
+            </a:r>
+          </a:p>
+          <a:p>
+            <a:endParaRPr lang="en-US" dirty="0"/>
+          </a:p>
+          <a:p>
+            <a:r>
               <a:rPr lang="en-US" dirty="0"/>
-              <a:t>Guiding computer with the motion of eyes</a:t>
+              <a:t>By: Riken Shah, </a:t>
+            </a:r>
+            <a:r>
+              <a:rPr lang="en-US" dirty="0" err="1"/>
+              <a:t>Mateenrehan</a:t>
+            </a:r>
+            <a:r>
+              <a:rPr lang="en-US" dirty="0"/>
+              <a:t> Shaikh, </a:t>
+            </a:r>
+            <a:r>
+              <a:rPr lang="en-US" dirty="0" err="1"/>
+              <a:t>Ankitkumar</a:t>
+            </a:r>
+            <a:r>
+              <a:rPr lang="en-US" dirty="0"/>
+              <a:t> Jain, Azra Shaikh</a:t>
             </a:r>
           </a:p>
         </p:txBody>
@@ -7908,7 +7935,7 @@
             <a:pPr lvl="1" fontAlgn="base"/>
             <a:r>
               <a:rPr lang="en-US" sz="1800" dirty="0"/>
-              <a:t>Accessible platform for specially abled people</a:t>
+              <a:t>Making computer accessible to specially abled people</a:t>
             </a:r>
           </a:p>
           <a:p>
@@ -8204,13 +8231,15 @@
             <a:pPr fontAlgn="base"/>
             <a:r>
               <a:rPr lang="en-US" dirty="0"/>
-              <a:t>Volume of data (</a:t>
-            </a:r>
-            <a:r>
-              <a:rPr lang="en-US"/>
-              <a:t>30fps)</a:t>
-            </a:r>
-            <a:endParaRPr lang="en-US" dirty="0"/>
+              <a:t>Volume of data (30fps)</a:t>
+            </a:r>
+          </a:p>
+          <a:p>
+            <a:pPr fontAlgn="base"/>
+            <a:r>
+              <a:rPr lang="en-US" dirty="0"/>
+              <a:t>Synchronizing the speed of eye blink with the server</a:t>
+            </a:r>
           </a:p>
         </p:txBody>
       </p:sp>

</xml_diff>